<commit_message>
presentation of first milestone adapted
</commit_message>
<xml_diff>
--- a/documents/assignment-1.pptx
+++ b/documents/assignment-1.pptx
@@ -145,7 +145,7 @@
   <p:extLst>
     <p:ext uri="{EFAFB233-063F-42B5-8137-9DF3F51BA10A}">
       <p15:sldGuideLst xmlns:p15="http://schemas.microsoft.com/office/powerpoint/2012/main">
-        <p15:guide id="1" orient="horz" pos="709" userDrawn="1">
+        <p15:guide id="1" orient="horz" pos="1419" userDrawn="1">
           <p15:clr>
             <a:srgbClr val="A4A3A4"/>
           </p15:clr>
@@ -170,7 +170,7 @@
             <a:srgbClr val="A4A3A4"/>
           </p15:clr>
         </p15:guide>
-        <p15:guide id="7" pos="3953" userDrawn="1">
+        <p15:guide id="7" pos="4317" userDrawn="1">
           <p15:clr>
             <a:srgbClr val="A4A3A4"/>
           </p15:clr>
@@ -275,14 +275,14 @@
           <a:effectLst/>
           <a:extLst>
             <a:ext uri="{909E8E84-426E-40dd-AFC4-6F175D3DCCD1}">
-              <a14:hiddenFill xmlns:a14="http://schemas.microsoft.com/office/drawing/2010/main" xmlns="">
+              <a14:hiddenFill xmlns="" xmlns:a14="http://schemas.microsoft.com/office/drawing/2010/main">
                 <a:solidFill>
                   <a:schemeClr val="accent1"/>
                 </a:solidFill>
               </a14:hiddenFill>
             </a:ext>
             <a:ext uri="{91240B29-F687-4f45-9708-019B960494DF}">
-              <a14:hiddenLine xmlns:a14="http://schemas.microsoft.com/office/drawing/2010/main" xmlns="" w="9525">
+              <a14:hiddenLine xmlns="" xmlns:a14="http://schemas.microsoft.com/office/drawing/2010/main" w="9525">
                 <a:solidFill>
                   <a:schemeClr val="tx1"/>
                 </a:solidFill>
@@ -292,7 +292,7 @@
               </a14:hiddenLine>
             </a:ext>
             <a:ext uri="{AF507438-7753-43e0-B8FC-AC1667EBCBE1}">
-              <a14:hiddenEffects xmlns:a14="http://schemas.microsoft.com/office/drawing/2010/main" xmlns="">
+              <a14:hiddenEffects xmlns="" xmlns:a14="http://schemas.microsoft.com/office/drawing/2010/main">
                 <a:effectLst>
                   <a:outerShdw blurRad="63500" dist="38099" dir="2700000" algn="ctr" rotWithShape="0">
                     <a:schemeClr val="bg2">
@@ -303,7 +303,7 @@
               </a14:hiddenEffects>
             </a:ext>
             <a:ext uri="{FAA26D3D-D897-4be2-8F04-BA451C77F1D7}">
-              <ma14:placeholderFlag xmlns:ma14="http://schemas.microsoft.com/office/mac/drawingml/2011/main" xmlns="" val="1"/>
+              <ma14:placeholderFlag xmlns="" xmlns:ma14="http://schemas.microsoft.com/office/mac/drawingml/2011/main" val="1"/>
             </a:ext>
           </a:extLst>
         </p:spPr>
@@ -348,14 +348,14 @@
           <a:effectLst/>
           <a:extLst>
             <a:ext uri="{909E8E84-426E-40dd-AFC4-6F175D3DCCD1}">
-              <a14:hiddenFill xmlns:a14="http://schemas.microsoft.com/office/drawing/2010/main" xmlns="">
+              <a14:hiddenFill xmlns="" xmlns:a14="http://schemas.microsoft.com/office/drawing/2010/main">
                 <a:solidFill>
                   <a:schemeClr val="accent1"/>
                 </a:solidFill>
               </a14:hiddenFill>
             </a:ext>
             <a:ext uri="{91240B29-F687-4f45-9708-019B960494DF}">
-              <a14:hiddenLine xmlns:a14="http://schemas.microsoft.com/office/drawing/2010/main" xmlns="" w="9525">
+              <a14:hiddenLine xmlns="" xmlns:a14="http://schemas.microsoft.com/office/drawing/2010/main" w="9525">
                 <a:solidFill>
                   <a:schemeClr val="tx1"/>
                 </a:solidFill>
@@ -365,7 +365,7 @@
               </a14:hiddenLine>
             </a:ext>
             <a:ext uri="{AF507438-7753-43e0-B8FC-AC1667EBCBE1}">
-              <a14:hiddenEffects xmlns:a14="http://schemas.microsoft.com/office/drawing/2010/main" xmlns="">
+              <a14:hiddenEffects xmlns="" xmlns:a14="http://schemas.microsoft.com/office/drawing/2010/main">
                 <a:effectLst>
                   <a:outerShdw blurRad="63500" dist="38099" dir="2700000" algn="ctr" rotWithShape="0">
                     <a:schemeClr val="bg2">
@@ -376,7 +376,7 @@
               </a14:hiddenEffects>
             </a:ext>
             <a:ext uri="{FAA26D3D-D897-4be2-8F04-BA451C77F1D7}">
-              <ma14:placeholderFlag xmlns:ma14="http://schemas.microsoft.com/office/mac/drawingml/2011/main" xmlns="" val="1"/>
+              <ma14:placeholderFlag xmlns="" xmlns:ma14="http://schemas.microsoft.com/office/mac/drawingml/2011/main" val="1"/>
             </a:ext>
           </a:extLst>
         </p:spPr>
@@ -426,7 +426,7 @@
           <a:effectLst/>
           <a:extLst>
             <a:ext uri="{AF507438-7753-43e0-B8FC-AC1667EBCBE1}">
-              <a14:hiddenEffects xmlns:a14="http://schemas.microsoft.com/office/drawing/2010/main" xmlns="">
+              <a14:hiddenEffects xmlns="" xmlns:a14="http://schemas.microsoft.com/office/drawing/2010/main">
                 <a:effectLst>
                   <a:outerShdw blurRad="63500" dist="38099" dir="2700000" algn="ctr" rotWithShape="0">
                     <a:srgbClr val="000000">
@@ -437,7 +437,7 @@
               </a14:hiddenEffects>
             </a:ext>
             <a:ext uri="{53640926-AAD7-44d8-BBD7-CCE9431645EC}">
-              <a14:shadowObscured xmlns:a14="http://schemas.microsoft.com/office/drawing/2010/main" xmlns="" val="1"/>
+              <a14:shadowObscured xmlns="" xmlns:a14="http://schemas.microsoft.com/office/drawing/2010/main" val="1"/>
             </a:ext>
           </a:extLst>
         </p:spPr>
@@ -467,14 +467,14 @@
           <a:effectLst/>
           <a:extLst>
             <a:ext uri="{909E8E84-426E-40dd-AFC4-6F175D3DCCD1}">
-              <a14:hiddenFill xmlns:a14="http://schemas.microsoft.com/office/drawing/2010/main" xmlns="">
+              <a14:hiddenFill xmlns="" xmlns:a14="http://schemas.microsoft.com/office/drawing/2010/main">
                 <a:solidFill>
                   <a:schemeClr val="accent1"/>
                 </a:solidFill>
               </a14:hiddenFill>
             </a:ext>
             <a:ext uri="{91240B29-F687-4f45-9708-019B960494DF}">
-              <a14:hiddenLine xmlns:a14="http://schemas.microsoft.com/office/drawing/2010/main" xmlns="" w="9525">
+              <a14:hiddenLine xmlns="" xmlns:a14="http://schemas.microsoft.com/office/drawing/2010/main" w="9525">
                 <a:solidFill>
                   <a:schemeClr val="tx1"/>
                 </a:solidFill>
@@ -484,7 +484,7 @@
               </a14:hiddenLine>
             </a:ext>
             <a:ext uri="{AF507438-7753-43e0-B8FC-AC1667EBCBE1}">
-              <a14:hiddenEffects xmlns:a14="http://schemas.microsoft.com/office/drawing/2010/main" xmlns="">
+              <a14:hiddenEffects xmlns="" xmlns:a14="http://schemas.microsoft.com/office/drawing/2010/main">
                 <a:effectLst>
                   <a:outerShdw blurRad="63500" dist="38099" dir="2700000" algn="ctr" rotWithShape="0">
                     <a:schemeClr val="bg2">
@@ -495,7 +495,7 @@
               </a14:hiddenEffects>
             </a:ext>
             <a:ext uri="{FAA26D3D-D897-4be2-8F04-BA451C77F1D7}">
-              <ma14:placeholderFlag xmlns:ma14="http://schemas.microsoft.com/office/mac/drawingml/2011/main" xmlns="" val="1"/>
+              <ma14:placeholderFlag xmlns="" xmlns:ma14="http://schemas.microsoft.com/office/mac/drawingml/2011/main" val="1"/>
             </a:ext>
           </a:extLst>
         </p:spPr>
@@ -568,14 +568,14 @@
           <a:effectLst/>
           <a:extLst>
             <a:ext uri="{909E8E84-426E-40dd-AFC4-6F175D3DCCD1}">
-              <a14:hiddenFill xmlns:a14="http://schemas.microsoft.com/office/drawing/2010/main" xmlns="">
+              <a14:hiddenFill xmlns="" xmlns:a14="http://schemas.microsoft.com/office/drawing/2010/main">
                 <a:solidFill>
                   <a:schemeClr val="accent1"/>
                 </a:solidFill>
               </a14:hiddenFill>
             </a:ext>
             <a:ext uri="{91240B29-F687-4f45-9708-019B960494DF}">
-              <a14:hiddenLine xmlns:a14="http://schemas.microsoft.com/office/drawing/2010/main" xmlns="" w="9525">
+              <a14:hiddenLine xmlns="" xmlns:a14="http://schemas.microsoft.com/office/drawing/2010/main" w="9525">
                 <a:solidFill>
                   <a:schemeClr val="tx1"/>
                 </a:solidFill>
@@ -585,7 +585,7 @@
               </a14:hiddenLine>
             </a:ext>
             <a:ext uri="{AF507438-7753-43e0-B8FC-AC1667EBCBE1}">
-              <a14:hiddenEffects xmlns:a14="http://schemas.microsoft.com/office/drawing/2010/main" xmlns="">
+              <a14:hiddenEffects xmlns="" xmlns:a14="http://schemas.microsoft.com/office/drawing/2010/main">
                 <a:effectLst>
                   <a:outerShdw blurRad="63500" dist="38099" dir="2700000" algn="ctr" rotWithShape="0">
                     <a:schemeClr val="bg2">
@@ -596,7 +596,7 @@
               </a14:hiddenEffects>
             </a:ext>
             <a:ext uri="{FAA26D3D-D897-4be2-8F04-BA451C77F1D7}">
-              <ma14:placeholderFlag xmlns:ma14="http://schemas.microsoft.com/office/mac/drawingml/2011/main" xmlns="" val="1"/>
+              <ma14:placeholderFlag xmlns="" xmlns:ma14="http://schemas.microsoft.com/office/mac/drawingml/2011/main" val="1"/>
             </a:ext>
           </a:extLst>
         </p:spPr>
@@ -641,14 +641,14 @@
           <a:effectLst/>
           <a:extLst>
             <a:ext uri="{909E8E84-426E-40dd-AFC4-6F175D3DCCD1}">
-              <a14:hiddenFill xmlns:a14="http://schemas.microsoft.com/office/drawing/2010/main" xmlns="">
+              <a14:hiddenFill xmlns="" xmlns:a14="http://schemas.microsoft.com/office/drawing/2010/main">
                 <a:solidFill>
                   <a:schemeClr val="accent1"/>
                 </a:solidFill>
               </a14:hiddenFill>
             </a:ext>
             <a:ext uri="{91240B29-F687-4f45-9708-019B960494DF}">
-              <a14:hiddenLine xmlns:a14="http://schemas.microsoft.com/office/drawing/2010/main" xmlns="" w="9525">
+              <a14:hiddenLine xmlns="" xmlns:a14="http://schemas.microsoft.com/office/drawing/2010/main" w="9525">
                 <a:solidFill>
                   <a:schemeClr val="tx1"/>
                 </a:solidFill>
@@ -658,7 +658,7 @@
               </a14:hiddenLine>
             </a:ext>
             <a:ext uri="{AF507438-7753-43e0-B8FC-AC1667EBCBE1}">
-              <a14:hiddenEffects xmlns:a14="http://schemas.microsoft.com/office/drawing/2010/main" xmlns="">
+              <a14:hiddenEffects xmlns="" xmlns:a14="http://schemas.microsoft.com/office/drawing/2010/main">
                 <a:effectLst>
                   <a:outerShdw blurRad="63500" dist="38099" dir="2700000" algn="ctr" rotWithShape="0">
                     <a:schemeClr val="bg2">
@@ -669,7 +669,7 @@
               </a14:hiddenEffects>
             </a:ext>
             <a:ext uri="{FAA26D3D-D897-4be2-8F04-BA451C77F1D7}">
-              <ma14:placeholderFlag xmlns:ma14="http://schemas.microsoft.com/office/mac/drawingml/2011/main" xmlns="" val="1"/>
+              <ma14:placeholderFlag xmlns="" xmlns:ma14="http://schemas.microsoft.com/office/mac/drawingml/2011/main" val="1"/>
             </a:ext>
           </a:extLst>
         </p:spPr>
@@ -1073,7 +1073,7 @@
           <a:effectLst/>
           <a:extLst>
             <a:ext uri="{AF507438-7753-43e0-B8FC-AC1667EBCBE1}">
-              <a14:hiddenEffects xmlns:a14="http://schemas.microsoft.com/office/drawing/2010/main" xmlns="">
+              <a14:hiddenEffects xmlns="" xmlns:a14="http://schemas.microsoft.com/office/drawing/2010/main">
                 <a:effectLst>
                   <a:outerShdw blurRad="63500" dist="35921" dir="2700000" algn="ctr" rotWithShape="0">
                     <a:schemeClr val="bg2"/>
@@ -1959,7 +1959,7 @@
           <a:noFill/>
           <a:extLst>
             <a:ext uri="{909E8E84-426E-40dd-AFC4-6F175D3DCCD1}">
-              <a14:hiddenFill xmlns:a14="http://schemas.microsoft.com/office/drawing/2010/main" xmlns="">
+              <a14:hiddenFill xmlns="" xmlns:a14="http://schemas.microsoft.com/office/drawing/2010/main">
                 <a:solidFill>
                   <a:srgbClr val="FFFFFF"/>
                 </a:solidFill>
@@ -1993,14 +1993,14 @@
           <a:effectLst/>
           <a:extLst>
             <a:ext uri="{909E8E84-426E-40dd-AFC4-6F175D3DCCD1}">
-              <a14:hiddenFill xmlns:a14="http://schemas.microsoft.com/office/drawing/2010/main" xmlns="">
+              <a14:hiddenFill xmlns="" xmlns:a14="http://schemas.microsoft.com/office/drawing/2010/main">
                 <a:solidFill>
                   <a:schemeClr val="accent1"/>
                 </a:solidFill>
               </a14:hiddenFill>
             </a:ext>
             <a:ext uri="{91240B29-F687-4f45-9708-019B960494DF}">
-              <a14:hiddenLine xmlns:a14="http://schemas.microsoft.com/office/drawing/2010/main" xmlns="" w="9525">
+              <a14:hiddenLine xmlns="" xmlns:a14="http://schemas.microsoft.com/office/drawing/2010/main" w="9525">
                 <a:solidFill>
                   <a:schemeClr val="tx1"/>
                 </a:solidFill>
@@ -2010,7 +2010,7 @@
               </a14:hiddenLine>
             </a:ext>
             <a:ext uri="{AF507438-7753-43e0-B8FC-AC1667EBCBE1}">
-              <a14:hiddenEffects xmlns:a14="http://schemas.microsoft.com/office/drawing/2010/main" xmlns="">
+              <a14:hiddenEffects xmlns="" xmlns:a14="http://schemas.microsoft.com/office/drawing/2010/main">
                 <a:effectLst>
                   <a:outerShdw blurRad="63500" dist="38099" dir="2700000" algn="ctr" rotWithShape="0">
                     <a:schemeClr val="bg2">
@@ -2021,7 +2021,7 @@
               </a14:hiddenEffects>
             </a:ext>
             <a:ext uri="{FAA26D3D-D897-4be2-8F04-BA451C77F1D7}">
-              <ma14:placeholderFlag xmlns:ma14="http://schemas.microsoft.com/office/mac/drawingml/2011/main" xmlns="" val="1"/>
+              <ma14:placeholderFlag xmlns="" xmlns:ma14="http://schemas.microsoft.com/office/mac/drawingml/2011/main" val="1"/>
             </a:ext>
           </a:extLst>
         </p:spPr>
@@ -2075,14 +2075,14 @@
           <a:effectLst/>
           <a:extLst>
             <a:ext uri="{909E8E84-426E-40dd-AFC4-6F175D3DCCD1}">
-              <a14:hiddenFill xmlns:a14="http://schemas.microsoft.com/office/drawing/2010/main" xmlns="">
+              <a14:hiddenFill xmlns="" xmlns:a14="http://schemas.microsoft.com/office/drawing/2010/main">
                 <a:solidFill>
                   <a:schemeClr val="accent1"/>
                 </a:solidFill>
               </a14:hiddenFill>
             </a:ext>
             <a:ext uri="{91240B29-F687-4f45-9708-019B960494DF}">
-              <a14:hiddenLine xmlns:a14="http://schemas.microsoft.com/office/drawing/2010/main" xmlns="" w="9525">
+              <a14:hiddenLine xmlns="" xmlns:a14="http://schemas.microsoft.com/office/drawing/2010/main" w="9525">
                 <a:solidFill>
                   <a:schemeClr val="tx1"/>
                 </a:solidFill>
@@ -2092,7 +2092,7 @@
               </a14:hiddenLine>
             </a:ext>
             <a:ext uri="{AF507438-7753-43e0-B8FC-AC1667EBCBE1}">
-              <a14:hiddenEffects xmlns:a14="http://schemas.microsoft.com/office/drawing/2010/main" xmlns="">
+              <a14:hiddenEffects xmlns="" xmlns:a14="http://schemas.microsoft.com/office/drawing/2010/main">
                 <a:effectLst>
                   <a:outerShdw blurRad="63500" dist="38099" dir="2700000" algn="ctr" rotWithShape="0">
                     <a:schemeClr val="bg2">
@@ -2103,7 +2103,7 @@
               </a14:hiddenEffects>
             </a:ext>
             <a:ext uri="{FAA26D3D-D897-4be2-8F04-BA451C77F1D7}">
-              <ma14:placeholderFlag xmlns:ma14="http://schemas.microsoft.com/office/mac/drawingml/2011/main" xmlns="" val="1"/>
+              <ma14:placeholderFlag xmlns="" xmlns:ma14="http://schemas.microsoft.com/office/mac/drawingml/2011/main" val="1"/>
             </a:ext>
           </a:extLst>
         </p:spPr>
@@ -2221,14 +2221,14 @@
           <a:effectLst/>
           <a:extLst>
             <a:ext uri="{909E8E84-426E-40dd-AFC4-6F175D3DCCD1}">
-              <a14:hiddenFill xmlns:a14="http://schemas.microsoft.com/office/drawing/2010/main" xmlns="">
+              <a14:hiddenFill xmlns="" xmlns:a14="http://schemas.microsoft.com/office/drawing/2010/main">
                 <a:solidFill>
                   <a:schemeClr val="accent1"/>
                 </a:solidFill>
               </a14:hiddenFill>
             </a:ext>
             <a:ext uri="{91240B29-F687-4f45-9708-019B960494DF}">
-              <a14:hiddenLine xmlns:a14="http://schemas.microsoft.com/office/drawing/2010/main" xmlns="" w="9525">
+              <a14:hiddenLine xmlns="" xmlns:a14="http://schemas.microsoft.com/office/drawing/2010/main" w="9525">
                 <a:solidFill>
                   <a:schemeClr val="tx1"/>
                 </a:solidFill>
@@ -2238,7 +2238,7 @@
               </a14:hiddenLine>
             </a:ext>
             <a:ext uri="{AF507438-7753-43e0-B8FC-AC1667EBCBE1}">
-              <a14:hiddenEffects xmlns:a14="http://schemas.microsoft.com/office/drawing/2010/main" xmlns="">
+              <a14:hiddenEffects xmlns="" xmlns:a14="http://schemas.microsoft.com/office/drawing/2010/main">
                 <a:effectLst>
                   <a:outerShdw blurRad="63500" dist="38099" dir="2700000" algn="ctr" rotWithShape="0">
                     <a:schemeClr val="bg2">
@@ -2249,7 +2249,7 @@
               </a14:hiddenEffects>
             </a:ext>
             <a:ext uri="{FAA26D3D-D897-4be2-8F04-BA451C77F1D7}">
-              <ma14:placeholderFlag xmlns:ma14="http://schemas.microsoft.com/office/mac/drawingml/2011/main" xmlns="" val="1"/>
+              <ma14:placeholderFlag xmlns="" xmlns:ma14="http://schemas.microsoft.com/office/mac/drawingml/2011/main" val="1"/>
             </a:ext>
           </a:extLst>
         </p:spPr>
@@ -2298,14 +2298,14 @@
           <a:effectLst/>
           <a:extLst>
             <a:ext uri="{909E8E84-426E-40dd-AFC4-6F175D3DCCD1}">
-              <a14:hiddenFill xmlns:a14="http://schemas.microsoft.com/office/drawing/2010/main" xmlns="">
+              <a14:hiddenFill xmlns="" xmlns:a14="http://schemas.microsoft.com/office/drawing/2010/main">
                 <a:solidFill>
                   <a:schemeClr val="accent1"/>
                 </a:solidFill>
               </a14:hiddenFill>
             </a:ext>
             <a:ext uri="{91240B29-F687-4f45-9708-019B960494DF}">
-              <a14:hiddenLine xmlns:a14="http://schemas.microsoft.com/office/drawing/2010/main" xmlns="" w="9525">
+              <a14:hiddenLine xmlns="" xmlns:a14="http://schemas.microsoft.com/office/drawing/2010/main" w="9525">
                 <a:solidFill>
                   <a:schemeClr val="tx1"/>
                 </a:solidFill>
@@ -2315,7 +2315,7 @@
               </a14:hiddenLine>
             </a:ext>
             <a:ext uri="{AF507438-7753-43e0-B8FC-AC1667EBCBE1}">
-              <a14:hiddenEffects xmlns:a14="http://schemas.microsoft.com/office/drawing/2010/main" xmlns="">
+              <a14:hiddenEffects xmlns="" xmlns:a14="http://schemas.microsoft.com/office/drawing/2010/main">
                 <a:effectLst>
                   <a:outerShdw blurRad="63500" dist="38099" dir="2700000" algn="ctr" rotWithShape="0">
                     <a:schemeClr val="bg2">
@@ -2326,7 +2326,7 @@
               </a14:hiddenEffects>
             </a:ext>
             <a:ext uri="{FAA26D3D-D897-4be2-8F04-BA451C77F1D7}">
-              <ma14:placeholderFlag xmlns:ma14="http://schemas.microsoft.com/office/mac/drawingml/2011/main" xmlns="" val="1"/>
+              <ma14:placeholderFlag xmlns="" xmlns:ma14="http://schemas.microsoft.com/office/mac/drawingml/2011/main" val="1"/>
             </a:ext>
           </a:extLst>
         </p:spPr>
@@ -2395,14 +2395,14 @@
           <a:effectLst/>
           <a:extLst>
             <a:ext uri="{909E8E84-426E-40dd-AFC4-6F175D3DCCD1}">
-              <a14:hiddenFill xmlns:a14="http://schemas.microsoft.com/office/drawing/2010/main" xmlns="">
+              <a14:hiddenFill xmlns="" xmlns:a14="http://schemas.microsoft.com/office/drawing/2010/main">
                 <a:solidFill>
                   <a:schemeClr val="accent1"/>
                 </a:solidFill>
               </a14:hiddenFill>
             </a:ext>
             <a:ext uri="{91240B29-F687-4f45-9708-019B960494DF}">
-              <a14:hiddenLine xmlns:a14="http://schemas.microsoft.com/office/drawing/2010/main" xmlns="" w="9525">
+              <a14:hiddenLine xmlns="" xmlns:a14="http://schemas.microsoft.com/office/drawing/2010/main" w="9525">
                 <a:solidFill>
                   <a:schemeClr val="tx1"/>
                 </a:solidFill>
@@ -2412,7 +2412,7 @@
               </a14:hiddenLine>
             </a:ext>
             <a:ext uri="{AF507438-7753-43e0-B8FC-AC1667EBCBE1}">
-              <a14:hiddenEffects xmlns:a14="http://schemas.microsoft.com/office/drawing/2010/main" xmlns="">
+              <a14:hiddenEffects xmlns="" xmlns:a14="http://schemas.microsoft.com/office/drawing/2010/main">
                 <a:effectLst>
                   <a:outerShdw blurRad="63500" dist="38099" dir="2700000" algn="ctr" rotWithShape="0">
                     <a:schemeClr val="bg2">
@@ -2423,7 +2423,7 @@
               </a14:hiddenEffects>
             </a:ext>
             <a:ext uri="{FAA26D3D-D897-4be2-8F04-BA451C77F1D7}">
-              <ma14:placeholderFlag xmlns:ma14="http://schemas.microsoft.com/office/mac/drawingml/2011/main" xmlns="" val="1"/>
+              <ma14:placeholderFlag xmlns="" xmlns:ma14="http://schemas.microsoft.com/office/mac/drawingml/2011/main" val="1"/>
             </a:ext>
           </a:extLst>
         </p:spPr>
@@ -2480,12 +2480,12 @@
           <a:effectLst/>
           <a:extLst>
             <a:ext uri="{909E8E84-426E-40dd-AFC4-6F175D3DCCD1}">
-              <a14:hiddenFill xmlns:a14="http://schemas.microsoft.com/office/drawing/2010/main" xmlns="">
+              <a14:hiddenFill xmlns="" xmlns:a14="http://schemas.microsoft.com/office/drawing/2010/main">
                 <a:noFill/>
               </a14:hiddenFill>
             </a:ext>
             <a:ext uri="{AF507438-7753-43e0-B8FC-AC1667EBCBE1}">
-              <a14:hiddenEffects xmlns:a14="http://schemas.microsoft.com/office/drawing/2010/main" xmlns="">
+              <a14:hiddenEffects xmlns="" xmlns:a14="http://schemas.microsoft.com/office/drawing/2010/main">
                 <a:effectLst>
                   <a:outerShdw blurRad="63500" dist="38099" dir="2700000" algn="ctr" rotWithShape="0">
                     <a:schemeClr val="bg2">
@@ -2528,14 +2528,14 @@
           <a:effectLst/>
           <a:extLst>
             <a:ext uri="{909E8E84-426E-40dd-AFC4-6F175D3DCCD1}">
-              <a14:hiddenFill xmlns:a14="http://schemas.microsoft.com/office/drawing/2010/main" xmlns="">
+              <a14:hiddenFill xmlns="" xmlns:a14="http://schemas.microsoft.com/office/drawing/2010/main">
                 <a:solidFill>
                   <a:schemeClr val="accent1"/>
                 </a:solidFill>
               </a14:hiddenFill>
             </a:ext>
             <a:ext uri="{91240B29-F687-4f45-9708-019B960494DF}">
-              <a14:hiddenLine xmlns:a14="http://schemas.microsoft.com/office/drawing/2010/main" xmlns="" w="9525">
+              <a14:hiddenLine xmlns="" xmlns:a14="http://schemas.microsoft.com/office/drawing/2010/main" w="9525">
                 <a:solidFill>
                   <a:schemeClr val="tx1"/>
                 </a:solidFill>
@@ -2545,7 +2545,7 @@
               </a14:hiddenLine>
             </a:ext>
             <a:ext uri="{AF507438-7753-43e0-B8FC-AC1667EBCBE1}">
-              <a14:hiddenEffects xmlns:a14="http://schemas.microsoft.com/office/drawing/2010/main" xmlns="">
+              <a14:hiddenEffects xmlns="" xmlns:a14="http://schemas.microsoft.com/office/drawing/2010/main">
                 <a:effectLst>
                   <a:outerShdw blurRad="63500" dist="38099" dir="2700000" algn="ctr" rotWithShape="0">
                     <a:schemeClr val="bg2">
@@ -3282,7 +3282,12 @@
             <p:ph type="title"/>
           </p:nvPr>
         </p:nvSpPr>
-        <p:spPr/>
+        <p:spPr>
+          <a:xfrm>
+            <a:off x="911225" y="1268413"/>
+            <a:ext cx="10369550" cy="792434"/>
+          </a:xfrm>
+        </p:spPr>
         <p:txBody>
           <a:bodyPr/>
           <a:lstStyle/>
@@ -3304,53 +3309,157 @@
             <p:ph type="body" idx="1"/>
           </p:nvPr>
         </p:nvSpPr>
-        <p:spPr/>
+        <p:spPr>
+          <a:xfrm>
+            <a:off x="911225" y="2205039"/>
+            <a:ext cx="5256783" cy="3887787"/>
+          </a:xfrm>
+        </p:spPr>
         <p:txBody>
           <a:bodyPr/>
           <a:lstStyle/>
           <a:p>
-            <a:pPr lvl="1">
-              <a:buFontTx/>
-              <a:buChar char="-"/>
+            <a:pPr>
+              <a:buFont typeface="Wingdings" panose="05000000000000000000" pitchFamily="2" charset="2"/>
+              <a:buChar char="§"/>
             </a:pPr>
             <a:r>
+              <a:rPr lang="de-CH" dirty="0" err="1"/>
+              <a:t>Structure</a:t>
+            </a:r>
+            <a:r>
               <a:rPr lang="de-CH" dirty="0"/>
-              <a:t>IEEE Std 830-1998</a:t>
-            </a:r>
-            <a:endParaRPr lang="en-US" dirty="0"/>
-          </a:p>
-          <a:p>
-            <a:pPr lvl="1">
-              <a:buFontTx/>
-              <a:buChar char="-"/>
+              <a:t> </a:t>
+            </a:r>
+            <a:r>
+              <a:rPr lang="de-CH" dirty="0" err="1"/>
+              <a:t>of</a:t>
+            </a:r>
+            <a:r>
+              <a:rPr lang="de-CH" dirty="0"/>
+              <a:t> SRS </a:t>
+            </a:r>
+            <a:r>
+              <a:rPr lang="de-CH" dirty="0" err="1"/>
+              <a:t>docuement</a:t>
+            </a:r>
+            <a:r>
+              <a:rPr lang="de-CH" dirty="0"/>
+              <a:t> </a:t>
+            </a:r>
+            <a:r>
+              <a:rPr lang="de-CH" dirty="0" err="1"/>
+              <a:t>based</a:t>
+            </a:r>
+            <a:r>
+              <a:rPr lang="de-CH" dirty="0"/>
+              <a:t> on IEEE Std 830-1998</a:t>
+            </a:r>
+          </a:p>
+          <a:p>
+            <a:pPr marL="0" indent="0">
+              <a:buNone/>
             </a:pPr>
-            <a:r>
-              <a:rPr lang="en-US" dirty="0"/>
-              <a:t>HTML (high </a:t>
-            </a:r>
-            <a:r>
-              <a:rPr lang="en-US" dirty="0" err="1"/>
-              <a:t>prio</a:t>
-            </a:r>
-            <a:r>
-              <a:rPr lang="en-US" dirty="0"/>
-              <a:t>) and Markdown (low </a:t>
-            </a:r>
-            <a:r>
-              <a:rPr lang="en-US" dirty="0" err="1"/>
-              <a:t>prio</a:t>
-            </a:r>
-            <a:r>
-              <a:rPr lang="en-US" dirty="0"/>
-              <a:t>)</a:t>
-            </a:r>
-          </a:p>
-          <a:p>
-            <a:pPr lvl="1">
-              <a:buFontTx/>
-              <a:buChar char="-"/>
+            <a:endParaRPr lang="de-CH" dirty="0"/>
+          </a:p>
+          <a:p>
+            <a:pPr>
+              <a:buFont typeface="Wingdings" panose="05000000000000000000" pitchFamily="2" charset="2"/>
+              <a:buChar char="§"/>
             </a:pPr>
-            <a:endParaRPr lang="en-US" dirty="0"/>
+            <a:r>
+              <a:rPr lang="de-CH" dirty="0"/>
+              <a:t>Both, HTML (high </a:t>
+            </a:r>
+            <a:r>
+              <a:rPr lang="de-CH" dirty="0" err="1"/>
+              <a:t>priority</a:t>
+            </a:r>
+            <a:r>
+              <a:rPr lang="de-CH" dirty="0"/>
+              <a:t>) and </a:t>
+            </a:r>
+            <a:r>
+              <a:rPr lang="de-CH" dirty="0" err="1"/>
+              <a:t>Markdown</a:t>
+            </a:r>
+            <a:r>
+              <a:rPr lang="de-CH" dirty="0"/>
+              <a:t> (</a:t>
+            </a:r>
+            <a:r>
+              <a:rPr lang="de-CH" dirty="0" err="1"/>
+              <a:t>low</a:t>
+            </a:r>
+            <a:r>
+              <a:rPr lang="de-CH" dirty="0"/>
+              <a:t> </a:t>
+            </a:r>
+            <a:r>
+              <a:rPr lang="de-CH" dirty="0" err="1"/>
+              <a:t>priority</a:t>
+            </a:r>
+            <a:r>
+              <a:rPr lang="de-CH" dirty="0"/>
+              <a:t>) supported</a:t>
+            </a:r>
+          </a:p>
+          <a:p>
+            <a:pPr marL="0" indent="0">
+              <a:buNone/>
+            </a:pPr>
+            <a:endParaRPr lang="de-CH" dirty="0"/>
+          </a:p>
+          <a:p>
+            <a:pPr>
+              <a:buFont typeface="Wingdings" panose="05000000000000000000" pitchFamily="2" charset="2"/>
+              <a:buChar char="§"/>
+            </a:pPr>
+            <a:r>
+              <a:rPr lang="de-CH" dirty="0" err="1"/>
+              <a:t>Designed</a:t>
+            </a:r>
+            <a:r>
+              <a:rPr lang="de-CH" dirty="0"/>
+              <a:t> </a:t>
+            </a:r>
+            <a:r>
+              <a:rPr lang="de-CH" dirty="0" err="1"/>
+              <a:t>for</a:t>
+            </a:r>
+            <a:r>
+              <a:rPr lang="de-CH" dirty="0"/>
+              <a:t> </a:t>
+            </a:r>
+            <a:r>
+              <a:rPr lang="de-CH" dirty="0" err="1"/>
+              <a:t>people</a:t>
+            </a:r>
+            <a:r>
+              <a:rPr lang="de-CH" dirty="0"/>
+              <a:t> </a:t>
+            </a:r>
+            <a:r>
+              <a:rPr lang="de-CH" dirty="0" err="1"/>
+              <a:t>with</a:t>
+            </a:r>
+            <a:r>
+              <a:rPr lang="de-CH" dirty="0"/>
+              <a:t> a strong </a:t>
+            </a:r>
+            <a:r>
+              <a:rPr lang="de-CH" dirty="0" err="1"/>
+              <a:t>background</a:t>
+            </a:r>
+            <a:r>
+              <a:rPr lang="de-CH" dirty="0"/>
+              <a:t> in </a:t>
+            </a:r>
+            <a:r>
+              <a:rPr lang="de-CH" dirty="0" err="1"/>
+              <a:t>informatics</a:t>
+            </a:r>
+            <a:endParaRPr lang="de-CH" dirty="0"/>
           </a:p>
         </p:txBody>
       </p:sp>
@@ -3384,34 +3493,6 @@
       </p:sp>
       <p:sp>
         <p:nvSpPr>
-          <p:cNvPr id="5" name="Fußzeilenplatzhalter 4"/>
-          <p:cNvSpPr>
-            <a:spLocks noGrp="1"/>
-          </p:cNvSpPr>
-          <p:nvPr>
-            <p:ph type="ftr" sz="quarter" idx="11"/>
-          </p:nvPr>
-        </p:nvSpPr>
-        <p:spPr>
-          <a:xfrm>
-            <a:off x="2255308" y="6524625"/>
-            <a:ext cx="7008284" cy="215900"/>
-          </a:xfrm>
-        </p:spPr>
-        <p:txBody>
-          <a:bodyPr/>
-          <a:lstStyle/>
-          <a:p>
-            <a:r>
-              <a:rPr lang="en-US"/>
-              <a:t>Title of the presentation, Author</a:t>
-            </a:r>
-            <a:endParaRPr lang="en-US" dirty="0"/>
-          </a:p>
-        </p:txBody>
-      </p:sp>
-      <p:sp>
-        <p:nvSpPr>
           <p:cNvPr id="2" name="Foliennummernplatzhalter 1"/>
           <p:cNvSpPr>
             <a:spLocks noGrp="1"/>
@@ -3453,28 +3534,28 @@
           <p:nvPr>
             <p:extLst>
               <p:ext uri="{D42A27DB-BD31-4B8C-83A1-F6EECF244321}">
-                <p14:modId xmlns:p14="http://schemas.microsoft.com/office/powerpoint/2010/main" val="2424923980"/>
+                <p14:modId xmlns:p14="http://schemas.microsoft.com/office/powerpoint/2010/main" val="2757027147"/>
               </p:ext>
             </p:extLst>
           </p:nvPr>
         </p:nvGraphicFramePr>
         <p:xfrm>
-          <a:off x="6744072" y="1767642"/>
-          <a:ext cx="4795172" cy="3887787"/>
+          <a:off x="6866519" y="2517926"/>
+          <a:ext cx="4414256" cy="3578951"/>
         </p:xfrm>
         <a:graphic>
           <a:graphicData uri="http://schemas.openxmlformats.org/drawingml/2006/table">
             <a:tbl>
               <a:tblPr firstRow="1" firstCol="1" bandRow="1"/>
               <a:tblGrid>
-                <a:gridCol w="998839">
+                <a:gridCol w="919494">
                   <a:extLst>
                     <a:ext uri="{9D8B030D-6E8A-4147-A177-3AD203B41FA5}">
                       <a16:colId xmlns:a16="http://schemas.microsoft.com/office/drawing/2014/main" val="131772496"/>
                     </a:ext>
                   </a:extLst>
                 </a:gridCol>
-                <a:gridCol w="3796333">
+                <a:gridCol w="3494762">
                   <a:extLst>
                     <a:ext uri="{9D8B030D-6E8A-4147-A177-3AD203B41FA5}">
                       <a16:colId xmlns:a16="http://schemas.microsoft.com/office/drawing/2014/main" val="1954490935"/>
@@ -3482,7 +3563,7 @@
                   </a:extLst>
                 </a:gridCol>
               </a:tblGrid>
-              <a:tr h="161991">
+              <a:tr h="149123">
                 <a:tc>
                   <a:txBody>
                     <a:bodyPr/>
@@ -3497,7 +3578,7 @@
                         </a:spcAft>
                       </a:pPr>
                       <a:r>
-                        <a:rPr lang="en-US" sz="900">
+                        <a:rPr lang="en-US" sz="800" dirty="0">
                           <a:solidFill>
                             <a:srgbClr val="000000"/>
                           </a:solidFill>
@@ -3507,7 +3588,7 @@
                         </a:rPr>
                         <a:t>Requirement ID</a:t>
                       </a:r>
-                      <a:endParaRPr lang="de-CH" sz="900">
+                      <a:endParaRPr lang="de-CH" sz="800" dirty="0">
                         <a:solidFill>
                           <a:srgbClr val="000000"/>
                         </a:solidFill>
@@ -3517,7 +3598,7 @@
                       </a:endParaRPr>
                     </a:p>
                   </a:txBody>
-                  <a:tcPr marL="57625" marR="57625" marT="0" marB="0" anchor="ctr">
+                  <a:tcPr marL="53048" marR="53048" marT="0" marB="0" anchor="ctr">
                     <a:lnL w="12700" cap="flat" cmpd="sng" algn="ctr">
                       <a:solidFill>
                         <a:srgbClr val="000000"/>
@@ -3570,7 +3651,7 @@
                         </a:spcAft>
                       </a:pPr>
                       <a:r>
-                        <a:rPr lang="en-US" sz="900">
+                        <a:rPr lang="en-US" sz="800" dirty="0">
                           <a:solidFill>
                             <a:srgbClr val="000000"/>
                           </a:solidFill>
@@ -3580,7 +3661,7 @@
                         </a:rPr>
                         <a:t>ID that allows identifying each requirement uniquely.</a:t>
                       </a:r>
-                      <a:endParaRPr lang="de-CH" sz="900">
+                      <a:endParaRPr lang="de-CH" sz="800" dirty="0">
                         <a:solidFill>
                           <a:srgbClr val="000000"/>
                         </a:solidFill>
@@ -3590,7 +3671,7 @@
                       </a:endParaRPr>
                     </a:p>
                   </a:txBody>
-                  <a:tcPr marL="57625" marR="57625" marT="0" marB="0" anchor="ctr">
+                  <a:tcPr marL="53048" marR="53048" marT="0" marB="0" anchor="ctr">
                     <a:lnL w="12700" cap="flat" cmpd="sng" algn="ctr">
                       <a:solidFill>
                         <a:srgbClr val="000000"/>
@@ -3635,7 +3716,7 @@
                   </a:ext>
                 </a:extLst>
               </a:tr>
-              <a:tr h="161991">
+              <a:tr h="149123">
                 <a:tc>
                   <a:txBody>
                     <a:bodyPr/>
@@ -3650,7 +3731,7 @@
                         </a:spcAft>
                       </a:pPr>
                       <a:r>
-                        <a:rPr lang="en-US" sz="900">
+                        <a:rPr lang="en-US" sz="800">
                           <a:solidFill>
                             <a:srgbClr val="000000"/>
                           </a:solidFill>
@@ -3660,7 +3741,7 @@
                         </a:rPr>
                         <a:t>Title</a:t>
                       </a:r>
-                      <a:endParaRPr lang="de-CH" sz="900">
+                      <a:endParaRPr lang="de-CH" sz="800">
                         <a:solidFill>
                           <a:srgbClr val="000000"/>
                         </a:solidFill>
@@ -3670,7 +3751,7 @@
                       </a:endParaRPr>
                     </a:p>
                   </a:txBody>
-                  <a:tcPr marL="57625" marR="57625" marT="0" marB="0" anchor="ctr">
+                  <a:tcPr marL="53048" marR="53048" marT="0" marB="0" anchor="ctr">
                     <a:lnL w="12700" cap="flat" cmpd="sng" algn="ctr">
                       <a:solidFill>
                         <a:srgbClr val="000000"/>
@@ -3723,7 +3804,7 @@
                         </a:spcAft>
                       </a:pPr>
                       <a:r>
-                        <a:rPr lang="en-US" sz="900">
+                        <a:rPr lang="en-US" sz="800" dirty="0">
                           <a:solidFill>
                             <a:srgbClr val="000000"/>
                           </a:solidFill>
@@ -3733,7 +3814,7 @@
                         </a:rPr>
                         <a:t>Describes the requirement concise.</a:t>
                       </a:r>
-                      <a:endParaRPr lang="de-CH" sz="900">
+                      <a:endParaRPr lang="de-CH" sz="800" dirty="0">
                         <a:solidFill>
                           <a:srgbClr val="000000"/>
                         </a:solidFill>
@@ -3743,7 +3824,7 @@
                       </a:endParaRPr>
                     </a:p>
                   </a:txBody>
-                  <a:tcPr marL="57625" marR="57625" marT="0" marB="0" anchor="ctr">
+                  <a:tcPr marL="53048" marR="53048" marT="0" marB="0" anchor="ctr">
                     <a:lnL w="12700" cap="flat" cmpd="sng" algn="ctr">
                       <a:solidFill>
                         <a:srgbClr val="000000"/>
@@ -3788,7 +3869,7 @@
                   </a:ext>
                 </a:extLst>
               </a:tr>
-              <a:tr h="161991">
+              <a:tr h="149123">
                 <a:tc>
                   <a:txBody>
                     <a:bodyPr/>
@@ -3803,7 +3884,7 @@
                         </a:spcAft>
                       </a:pPr>
                       <a:r>
-                        <a:rPr lang="en-US" sz="900">
+                        <a:rPr lang="en-US" sz="800">
                           <a:solidFill>
                             <a:srgbClr val="000000"/>
                           </a:solidFill>
@@ -3813,7 +3894,7 @@
                         </a:rPr>
                         <a:t>Description</a:t>
                       </a:r>
-                      <a:endParaRPr lang="de-CH" sz="900">
+                      <a:endParaRPr lang="de-CH" sz="800">
                         <a:solidFill>
                           <a:srgbClr val="000000"/>
                         </a:solidFill>
@@ -3823,7 +3904,7 @@
                       </a:endParaRPr>
                     </a:p>
                   </a:txBody>
-                  <a:tcPr marL="57625" marR="57625" marT="0" marB="0" anchor="ctr">
+                  <a:tcPr marL="53048" marR="53048" marT="0" marB="0" anchor="ctr">
                     <a:lnL w="12700" cap="flat" cmpd="sng" algn="ctr">
                       <a:solidFill>
                         <a:srgbClr val="000000"/>
@@ -3876,7 +3957,7 @@
                         </a:spcAft>
                       </a:pPr>
                       <a:r>
-                        <a:rPr lang="en-US" sz="900">
+                        <a:rPr lang="en-US" sz="800">
                           <a:solidFill>
                             <a:srgbClr val="000000"/>
                           </a:solidFill>
@@ -3886,7 +3967,7 @@
                         </a:rPr>
                         <a:t>Defines the requirement in detail.</a:t>
                       </a:r>
-                      <a:endParaRPr lang="de-CH" sz="900">
+                      <a:endParaRPr lang="de-CH" sz="800">
                         <a:solidFill>
                           <a:srgbClr val="000000"/>
                         </a:solidFill>
@@ -3896,7 +3977,7 @@
                       </a:endParaRPr>
                     </a:p>
                   </a:txBody>
-                  <a:tcPr marL="57625" marR="57625" marT="0" marB="0" anchor="ctr">
+                  <a:tcPr marL="53048" marR="53048" marT="0" marB="0" anchor="ctr">
                     <a:lnL w="12700" cap="flat" cmpd="sng" algn="ctr">
                       <a:solidFill>
                         <a:srgbClr val="000000"/>
@@ -3941,7 +4022,7 @@
                   </a:ext>
                 </a:extLst>
               </a:tr>
-              <a:tr h="809956">
+              <a:tr h="745615">
                 <a:tc>
                   <a:txBody>
                     <a:bodyPr/>
@@ -3956,7 +4037,7 @@
                         </a:spcAft>
                       </a:pPr>
                       <a:r>
-                        <a:rPr lang="en-US" sz="900">
+                        <a:rPr lang="en-US" sz="800" dirty="0">
                           <a:solidFill>
                             <a:srgbClr val="000000"/>
                           </a:solidFill>
@@ -3966,7 +4047,7 @@
                         </a:rPr>
                         <a:t>Priority</a:t>
                       </a:r>
-                      <a:endParaRPr lang="de-CH" sz="900">
+                      <a:endParaRPr lang="de-CH" sz="800" dirty="0">
                         <a:solidFill>
                           <a:srgbClr val="000000"/>
                         </a:solidFill>
@@ -3976,7 +4057,7 @@
                       </a:endParaRPr>
                     </a:p>
                   </a:txBody>
-                  <a:tcPr marL="57625" marR="57625" marT="0" marB="0" anchor="ctr">
+                  <a:tcPr marL="53048" marR="53048" marT="0" marB="0" anchor="ctr">
                     <a:lnL w="12700" cap="flat" cmpd="sng" algn="ctr">
                       <a:solidFill>
                         <a:srgbClr val="000000"/>
@@ -4029,7 +4110,7 @@
                         </a:spcAft>
                       </a:pPr>
                       <a:r>
-                        <a:rPr lang="en-US" sz="900">
+                        <a:rPr lang="en-US" sz="800">
                           <a:solidFill>
                             <a:srgbClr val="000000"/>
                           </a:solidFill>
@@ -4040,7 +4121,7 @@
                         <a:t>Shows the order in which requirements should be implemented. Priorities are classified in 3 groups (highest to lowest) 1, 2, and 3.  Requirements of </a:t>
                       </a:r>
                       <a:r>
-                        <a:rPr lang="en-US" sz="900" b="1">
+                        <a:rPr lang="en-US" sz="800" b="1">
                           <a:solidFill>
                             <a:srgbClr val="000000"/>
                           </a:solidFill>
@@ -4051,7 +4132,7 @@
                         <a:t>priority 1</a:t>
                       </a:r>
                       <a:r>
-                        <a:rPr lang="en-US" sz="900">
+                        <a:rPr lang="en-US" sz="800">
                           <a:solidFill>
                             <a:srgbClr val="000000"/>
                           </a:solidFill>
@@ -4062,7 +4143,7 @@
                         <a:t> are mandatory for the first Implementation; Requirements of </a:t>
                       </a:r>
                       <a:r>
-                        <a:rPr lang="en-US" sz="900" b="1">
+                        <a:rPr lang="en-US" sz="800" b="1">
                           <a:solidFill>
                             <a:srgbClr val="000000"/>
                           </a:solidFill>
@@ -4073,7 +4154,7 @@
                         <a:t>priority 2</a:t>
                       </a:r>
                       <a:r>
-                        <a:rPr lang="en-US" sz="900">
+                        <a:rPr lang="en-US" sz="800">
                           <a:solidFill>
                             <a:srgbClr val="000000"/>
                           </a:solidFill>
@@ -4084,7 +4165,7 @@
                         <a:t> are mandatory for the final Implementation. A </a:t>
                       </a:r>
                       <a:r>
-                        <a:rPr lang="en-US" sz="900" b="1">
+                        <a:rPr lang="en-US" sz="800" b="1">
                           <a:solidFill>
                             <a:srgbClr val="000000"/>
                           </a:solidFill>
@@ -4095,7 +4176,7 @@
                         <a:t>priority</a:t>
                       </a:r>
                       <a:r>
-                        <a:rPr lang="en-US" sz="900">
+                        <a:rPr lang="en-US" sz="800">
                           <a:solidFill>
                             <a:srgbClr val="000000"/>
                           </a:solidFill>
@@ -4106,7 +4187,7 @@
                         <a:t> </a:t>
                       </a:r>
                       <a:r>
-                        <a:rPr lang="en-US" sz="900" b="1">
+                        <a:rPr lang="en-US" sz="800" b="1">
                           <a:solidFill>
                             <a:srgbClr val="000000"/>
                           </a:solidFill>
@@ -4117,7 +4198,7 @@
                         <a:t>greater or equal than 3</a:t>
                       </a:r>
                       <a:r>
-                        <a:rPr lang="en-US" sz="900">
+                        <a:rPr lang="en-US" sz="800">
                           <a:solidFill>
                             <a:srgbClr val="000000"/>
                           </a:solidFill>
@@ -4127,7 +4208,7 @@
                         </a:rPr>
                         <a:t> represents optional features.</a:t>
                       </a:r>
-                      <a:endParaRPr lang="de-CH" sz="900">
+                      <a:endParaRPr lang="de-CH" sz="800">
                         <a:solidFill>
                           <a:srgbClr val="000000"/>
                         </a:solidFill>
@@ -4137,7 +4218,7 @@
                       </a:endParaRPr>
                     </a:p>
                   </a:txBody>
-                  <a:tcPr marL="57625" marR="57625" marT="0" marB="0" anchor="ctr">
+                  <a:tcPr marL="53048" marR="53048" marT="0" marB="0" anchor="ctr">
                     <a:lnL w="12700" cap="flat" cmpd="sng" algn="ctr">
                       <a:solidFill>
                         <a:srgbClr val="000000"/>
@@ -4182,7 +4263,7 @@
                   </a:ext>
                 </a:extLst>
               </a:tr>
-              <a:tr h="2267876">
+              <a:tr h="2087722">
                 <a:tc>
                   <a:txBody>
                     <a:bodyPr/>
@@ -4197,7 +4278,7 @@
                         </a:spcAft>
                       </a:pPr>
                       <a:r>
-                        <a:rPr lang="en-US" sz="900">
+                        <a:rPr lang="en-US" sz="800">
                           <a:solidFill>
                             <a:srgbClr val="000000"/>
                           </a:solidFill>
@@ -4207,7 +4288,7 @@
                         </a:rPr>
                         <a:t>Risk</a:t>
                       </a:r>
-                      <a:endParaRPr lang="de-CH" sz="900">
+                      <a:endParaRPr lang="de-CH" sz="800">
                         <a:solidFill>
                           <a:srgbClr val="000000"/>
                         </a:solidFill>
@@ -4217,7 +4298,7 @@
                       </a:endParaRPr>
                     </a:p>
                   </a:txBody>
-                  <a:tcPr marL="57625" marR="57625" marT="0" marB="0" anchor="ctr">
+                  <a:tcPr marL="53048" marR="53048" marT="0" marB="0" anchor="ctr">
                     <a:lnL w="12700" cap="flat" cmpd="sng" algn="ctr">
                       <a:solidFill>
                         <a:srgbClr val="000000"/>
@@ -4270,7 +4351,7 @@
                         </a:spcAft>
                       </a:pPr>
                       <a:r>
-                        <a:rPr lang="en-US" sz="900" dirty="0">
+                        <a:rPr lang="en-US" sz="800" dirty="0">
                           <a:solidFill>
                             <a:srgbClr val="000000"/>
                           </a:solidFill>
@@ -4280,7 +4361,7 @@
                         </a:rPr>
                         <a:t>Specifies the risk of not implementing the requirement. It tells how critical the requirement is to the system as a whole. The following risk levels are defined over the impact of not being implemented correctly.</a:t>
                       </a:r>
-                      <a:endParaRPr lang="de-CH" sz="900" dirty="0">
+                      <a:endParaRPr lang="de-CH" sz="800" dirty="0">
                         <a:solidFill>
                           <a:srgbClr val="000000"/>
                         </a:solidFill>
@@ -4301,7 +4382,7 @@
                         <a:buChar char=""/>
                       </a:pPr>
                       <a:r>
-                        <a:rPr lang="en-US" sz="900" b="1" dirty="0">
+                        <a:rPr lang="en-US" sz="800" b="1" dirty="0">
                           <a:solidFill>
                             <a:srgbClr val="000000"/>
                           </a:solidFill>
@@ -4312,7 +4393,7 @@
                         <a:t>Critical</a:t>
                       </a:r>
                       <a:r>
-                        <a:rPr lang="en-US" sz="900" dirty="0">
+                        <a:rPr lang="en-US" sz="800" dirty="0">
                           <a:solidFill>
                             <a:srgbClr val="000000"/>
                           </a:solidFill>
@@ -4323,7 +4404,7 @@
                         <a:t> (C) It will break the main functionality of the system. The system cannot be used if this requirement is not implemented. </a:t>
                       </a:r>
                       <a:r>
-                        <a:rPr lang="de-CH" sz="900" dirty="0">
+                        <a:rPr lang="de-CH" sz="800" dirty="0">
                           <a:solidFill>
                             <a:srgbClr val="000000"/>
                           </a:solidFill>
@@ -4335,7 +4416,7 @@
                         <a:t>  </a:t>
                       </a:r>
-                      <a:endParaRPr lang="de-CH" sz="900" dirty="0">
+                      <a:endParaRPr lang="de-CH" sz="800" dirty="0">
                         <a:solidFill>
                           <a:srgbClr val="000000"/>
                         </a:solidFill>
@@ -4356,7 +4437,7 @@
                         <a:buChar char=""/>
                       </a:pPr>
                       <a:r>
-                        <a:rPr lang="en-US" sz="900" b="1" dirty="0">
+                        <a:rPr lang="en-US" sz="800" b="1" dirty="0">
                           <a:solidFill>
                             <a:srgbClr val="000000"/>
                           </a:solidFill>
@@ -4367,7 +4448,7 @@
                         <a:t>High</a:t>
                       </a:r>
                       <a:r>
-                        <a:rPr lang="en-US" sz="900" dirty="0">
+                        <a:rPr lang="en-US" sz="800" dirty="0">
                           <a:solidFill>
                             <a:srgbClr val="000000"/>
                           </a:solidFill>
@@ -4378,7 +4459,7 @@
                         <a:t> (H) It will impact the main functionality of the system. Some function of the system could be inaccessible, but the system can be generally used. </a:t>
                       </a:r>
                       <a:r>
-                        <a:rPr lang="de-CH" sz="900" dirty="0">
+                        <a:rPr lang="de-CH" sz="800" dirty="0">
                           <a:solidFill>
                             <a:srgbClr val="000000"/>
                           </a:solidFill>
@@ -4390,7 +4471,7 @@
                         <a:t>  </a:t>
                       </a:r>
-                      <a:endParaRPr lang="de-CH" sz="900" dirty="0">
+                      <a:endParaRPr lang="de-CH" sz="800" dirty="0">
                         <a:solidFill>
                           <a:srgbClr val="000000"/>
                         </a:solidFill>
@@ -4411,7 +4492,7 @@
                         <a:buChar char=""/>
                       </a:pPr>
                       <a:r>
-                        <a:rPr lang="en-US" sz="900" b="1" dirty="0">
+                        <a:rPr lang="en-US" sz="800" b="1" dirty="0">
                           <a:solidFill>
                             <a:srgbClr val="000000"/>
                           </a:solidFill>
@@ -4422,7 +4503,7 @@
                         <a:t>Medium</a:t>
                       </a:r>
                       <a:r>
-                        <a:rPr lang="en-US" sz="900" dirty="0">
+                        <a:rPr lang="en-US" sz="800" dirty="0">
                           <a:solidFill>
                             <a:srgbClr val="000000"/>
                           </a:solidFill>
@@ -4433,7 +4514,7 @@
                         <a:t> (M) It will impact some system features, but not the main functionality. The system can still be used with some limitation. </a:t>
                       </a:r>
                       <a:r>
-                        <a:rPr lang="de-CH" sz="900" dirty="0">
+                        <a:rPr lang="de-CH" sz="800" dirty="0">
                           <a:solidFill>
                             <a:srgbClr val="000000"/>
                           </a:solidFill>
@@ -4445,7 +4526,7 @@
                         <a:t>  </a:t>
                       </a:r>
-                      <a:endParaRPr lang="de-CH" sz="900" dirty="0">
+                      <a:endParaRPr lang="de-CH" sz="800" dirty="0">
                         <a:solidFill>
                           <a:srgbClr val="000000"/>
                         </a:solidFill>
@@ -4466,7 +4547,7 @@
                         <a:buChar char=""/>
                       </a:pPr>
                       <a:r>
-                        <a:rPr lang="en-US" sz="900" dirty="0">
+                        <a:rPr lang="en-US" sz="800" b="1" dirty="0">
                           <a:solidFill>
                             <a:srgbClr val="000000"/>
                           </a:solidFill>
@@ -4474,9 +4555,20 @@
                           <a:latin typeface="Arial" panose="020B0604020202020204" pitchFamily="34" charset="0"/>
                           <a:ea typeface="Arial" panose="020B0604020202020204" pitchFamily="34" charset="0"/>
                         </a:rPr>
-                        <a:t>Low (L) The system can be used without limitation, but with some workarounds.</a:t>
+                        <a:t>Low</a:t>
                       </a:r>
-                      <a:endParaRPr lang="de-CH" sz="900" dirty="0">
+                      <a:r>
+                        <a:rPr lang="en-US" sz="800" dirty="0">
+                          <a:solidFill>
+                            <a:srgbClr val="000000"/>
+                          </a:solidFill>
+                          <a:effectLst/>
+                          <a:latin typeface="Arial" panose="020B0604020202020204" pitchFamily="34" charset="0"/>
+                          <a:ea typeface="Arial" panose="020B0604020202020204" pitchFamily="34" charset="0"/>
+                        </a:rPr>
+                        <a:t> (L) The system can be used without limitation, but with some workarounds.</a:t>
+                      </a:r>
+                      <a:endParaRPr lang="de-CH" sz="800" dirty="0">
                         <a:solidFill>
                           <a:srgbClr val="000000"/>
                         </a:solidFill>
@@ -4486,7 +4578,7 @@
                       </a:endParaRPr>
                     </a:p>
                   </a:txBody>
-                  <a:tcPr marL="57625" marR="57625" marT="0" marB="0" anchor="ctr">
+                  <a:tcPr marL="53048" marR="53048" marT="0" marB="0" anchor="ctr">
                     <a:lnL w="12700" cap="flat" cmpd="sng" algn="ctr">
                       <a:solidFill>
                         <a:srgbClr val="000000"/>
@@ -4531,7 +4623,7 @@
                   </a:ext>
                 </a:extLst>
               </a:tr>
-              <a:tr h="323982">
+              <a:tr h="298245">
                 <a:tc>
                   <a:txBody>
                     <a:bodyPr/>
@@ -4546,7 +4638,7 @@
                         </a:spcAft>
                       </a:pPr>
                       <a:r>
-                        <a:rPr lang="en-US" sz="900">
+                        <a:rPr lang="en-US" sz="800" dirty="0">
                           <a:solidFill>
                             <a:srgbClr val="000000"/>
                           </a:solidFill>
@@ -4556,7 +4648,7 @@
                         </a:rPr>
                         <a:t>References</a:t>
                       </a:r>
-                      <a:endParaRPr lang="de-CH" sz="900">
+                      <a:endParaRPr lang="de-CH" sz="800" dirty="0">
                         <a:solidFill>
                           <a:srgbClr val="000000"/>
                         </a:solidFill>
@@ -4566,7 +4658,7 @@
                       </a:endParaRPr>
                     </a:p>
                   </a:txBody>
-                  <a:tcPr marL="57625" marR="57625" marT="0" marB="0" anchor="ctr">
+                  <a:tcPr marL="53048" marR="53048" marT="0" marB="0" anchor="ctr">
                     <a:lnL w="12700" cap="flat" cmpd="sng" algn="ctr">
                       <a:solidFill>
                         <a:srgbClr val="000000"/>
@@ -4619,7 +4711,7 @@
                         </a:spcAft>
                       </a:pPr>
                       <a:r>
-                        <a:rPr lang="en-US" sz="900" dirty="0">
+                        <a:rPr lang="en-US" sz="800" dirty="0">
                           <a:solidFill>
                             <a:srgbClr val="000000"/>
                           </a:solidFill>
@@ -4629,7 +4721,7 @@
                         </a:rPr>
                         <a:t>The IDs of requirement that are relevant in this context are listed here. </a:t>
                       </a:r>
-                      <a:endParaRPr lang="de-CH" sz="900" dirty="0">
+                      <a:endParaRPr lang="de-CH" sz="800" dirty="0">
                         <a:solidFill>
                           <a:srgbClr val="000000"/>
                         </a:solidFill>
@@ -4639,7 +4731,7 @@
                       </a:endParaRPr>
                     </a:p>
                   </a:txBody>
-                  <a:tcPr marL="57625" marR="57625" marT="0" marB="0" anchor="ctr">
+                  <a:tcPr marL="53048" marR="53048" marT="0" marB="0" anchor="ctr">
                     <a:lnL w="12700" cap="flat" cmpd="sng" algn="ctr">
                       <a:solidFill>
                         <a:srgbClr val="000000"/>
@@ -4688,6 +4780,41 @@
           </a:graphicData>
         </a:graphic>
       </p:graphicFrame>
+      <p:sp>
+        <p:nvSpPr>
+          <p:cNvPr id="6" name="Textfeld 5">
+            <a:extLst>
+              <a:ext uri="{FF2B5EF4-FFF2-40B4-BE49-F238E27FC236}">
+                <a16:creationId xmlns:a16="http://schemas.microsoft.com/office/drawing/2014/main" id="{328A8D09-03D4-42D2-878D-015A70874F30}"/>
+              </a:ext>
+            </a:extLst>
+          </p:cNvPr>
+          <p:cNvSpPr txBox="1"/>
+          <p:nvPr/>
+        </p:nvSpPr>
+        <p:spPr>
+          <a:xfrm>
+            <a:off x="6759518" y="2163983"/>
+            <a:ext cx="4321242" cy="353943"/>
+          </a:xfrm>
+          <a:prstGeom prst="rect">
+            <a:avLst/>
+          </a:prstGeom>
+          <a:noFill/>
+        </p:spPr>
+        <p:txBody>
+          <a:bodyPr wrap="square" rtlCol="0">
+            <a:spAutoFit/>
+          </a:bodyPr>
+          <a:lstStyle/>
+          <a:p>
+            <a:r>
+              <a:rPr lang="en-US" dirty="0"/>
+              <a:t>Structure of Requirements</a:t>
+            </a:r>
+          </a:p>
+        </p:txBody>
+      </p:sp>
     </p:spTree>
   </p:cSld>
   <p:clrMapOvr>
@@ -4736,14 +4863,6 @@
           <a:p>
             <a:r>
               <a:rPr lang="de-CH" dirty="0" err="1"/>
-              <a:t>Overview</a:t>
-            </a:r>
-            <a:r>
-              <a:rPr lang="de-CH" dirty="0"/>
-              <a:t>: </a:t>
-            </a:r>
-            <a:r>
-              <a:rPr lang="de-CH" dirty="0" err="1"/>
               <a:t>Functional</a:t>
             </a:r>
             <a:r>
@@ -4779,9 +4898,21 @@
           <a:bodyPr/>
           <a:lstStyle/>
           <a:p>
+            <a:pPr>
+              <a:buFont typeface="Wingdings" panose="05000000000000000000" pitchFamily="2" charset="2"/>
+              <a:buChar char="§"/>
+            </a:pPr>
             <a:r>
               <a:rPr lang="de-CH" dirty="0"/>
-              <a:t>Most </a:t>
+              <a:t>All </a:t>
+            </a:r>
+            <a:r>
+              <a:rPr lang="de-CH" dirty="0" err="1"/>
+              <a:t>commonly</a:t>
+            </a:r>
+            <a:r>
+              <a:rPr lang="de-CH" dirty="0"/>
+              <a:t> </a:t>
             </a:r>
             <a:r>
               <a:rPr lang="de-CH" dirty="0" err="1"/>
@@ -4789,18 +4920,84 @@
             </a:r>
             <a:r>
               <a:rPr lang="de-CH" dirty="0"/>
+              <a:t> tags </a:t>
+            </a:r>
+            <a:r>
+              <a:rPr lang="de-CH" dirty="0" err="1"/>
+              <a:t>are</a:t>
+            </a:r>
+            <a:r>
+              <a:rPr lang="de-CH" dirty="0"/>
+              <a:t> supported (</a:t>
+            </a:r>
+            <a:r>
+              <a:rPr lang="de-CH" dirty="0" err="1"/>
+              <a:t>creating</a:t>
+            </a:r>
+            <a:r>
+              <a:rPr lang="de-CH" dirty="0"/>
               <a:t> </a:t>
             </a:r>
             <a:r>
               <a:rPr lang="de-CH" dirty="0" err="1"/>
-              <a:t>standard</a:t>
+              <a:t>hyperlinks</a:t>
             </a:r>
             <a:r>
               <a:rPr lang="de-CH" dirty="0"/>
-              <a:t> tags (A, P, IMG, …)</a:t>
-            </a:r>
-          </a:p>
-          <a:p>
+              <a:t>, </a:t>
+            </a:r>
+            <a:r>
+              <a:rPr lang="de-CH" dirty="0" err="1"/>
+              <a:t>bullet</a:t>
+            </a:r>
+            <a:r>
+              <a:rPr lang="de-CH" dirty="0"/>
+              <a:t> </a:t>
+            </a:r>
+            <a:r>
+              <a:rPr lang="de-CH" dirty="0" err="1"/>
+              <a:t>lists</a:t>
+            </a:r>
+            <a:r>
+              <a:rPr lang="de-CH" dirty="0"/>
+              <a:t>, </a:t>
+            </a:r>
+            <a:r>
+              <a:rPr lang="de-CH" dirty="0" err="1"/>
+              <a:t>tables</a:t>
+            </a:r>
+            <a:r>
+              <a:rPr lang="de-CH" dirty="0"/>
+              <a:t> </a:t>
+            </a:r>
+            <a:r>
+              <a:rPr lang="de-CH" dirty="0" err="1"/>
+              <a:t>or</a:t>
+            </a:r>
+            <a:r>
+              <a:rPr lang="de-CH" dirty="0"/>
+              <a:t> </a:t>
+            </a:r>
+            <a:r>
+              <a:rPr lang="de-CH" dirty="0" err="1"/>
+              <a:t>headings</a:t>
+            </a:r>
+            <a:r>
+              <a:rPr lang="de-CH" dirty="0"/>
+              <a:t>)</a:t>
+            </a:r>
+          </a:p>
+          <a:p>
+            <a:pPr marL="0" indent="0">
+              <a:buNone/>
+            </a:pPr>
+            <a:endParaRPr lang="de-CH" dirty="0"/>
+          </a:p>
+          <a:p>
+            <a:pPr>
+              <a:buFont typeface="Wingdings" panose="05000000000000000000" pitchFamily="2" charset="2"/>
+              <a:buChar char="§"/>
+            </a:pPr>
             <a:r>
               <a:rPr lang="de-CH" dirty="0"/>
               <a:t>Inline Text Styling (Color, Size, </a:t>
@@ -4811,45 +5008,11 @@
             </a:r>
             <a:r>
               <a:rPr lang="de-CH" dirty="0"/>
-              <a:t>)</a:t>
-            </a:r>
-          </a:p>
-          <a:p>
+              <a:t>) </a:t>
+            </a:r>
             <a:r>
               <a:rPr lang="de-CH" dirty="0" err="1"/>
-              <a:t>Include</a:t>
-            </a:r>
-            <a:r>
-              <a:rPr lang="de-CH" dirty="0"/>
-              <a:t> User </a:t>
-            </a:r>
-            <a:r>
-              <a:rPr lang="de-CH" dirty="0" err="1"/>
-              <a:t>defined</a:t>
-            </a:r>
-            <a:r>
-              <a:rPr lang="de-CH" dirty="0"/>
-              <a:t> HTML, </a:t>
-            </a:r>
-            <a:r>
-              <a:rPr lang="de-CH" dirty="0" err="1"/>
-              <a:t>with</a:t>
-            </a:r>
-            <a:r>
-              <a:rPr lang="de-CH" dirty="0"/>
-              <a:t> tags not </a:t>
-            </a:r>
-            <a:r>
-              <a:rPr lang="de-CH" dirty="0" err="1"/>
-              <a:t>defined</a:t>
-            </a:r>
-            <a:r>
-              <a:rPr lang="de-CH" dirty="0"/>
-              <a:t> in </a:t>
-            </a:r>
-            <a:r>
-              <a:rPr lang="de-CH" dirty="0" err="1"/>
-              <a:t>our</a:t>
+              <a:t>is</a:t>
             </a:r>
             <a:r>
               <a:rPr lang="de-CH" dirty="0"/>
@@ -4857,25 +5020,69 @@
             </a:r>
             <a:r>
               <a:rPr lang="de-CH" dirty="0" err="1"/>
-              <a:t>spec</a:t>
-            </a:r>
+              <a:t>available</a:t>
+            </a:r>
+            <a:endParaRPr lang="de-CH" dirty="0"/>
+          </a:p>
+          <a:p>
+            <a:pPr marL="0" indent="0">
+              <a:buNone/>
+            </a:pPr>
+            <a:endParaRPr lang="de-CH" dirty="0"/>
+          </a:p>
+          <a:p>
+            <a:pPr>
+              <a:buFont typeface="Wingdings" panose="05000000000000000000" pitchFamily="2" charset="2"/>
+              <a:buChar char="§"/>
+            </a:pPr>
             <a:r>
               <a:rPr lang="de-CH" dirty="0"/>
-              <a:t>.</a:t>
-            </a:r>
-          </a:p>
-          <a:p>
+              <a:t>User-</a:t>
+            </a:r>
+            <a:r>
+              <a:rPr lang="de-CH" dirty="0" err="1"/>
+              <a:t>specified</a:t>
+            </a:r>
+            <a:r>
+              <a:rPr lang="de-CH" dirty="0"/>
+              <a:t> tags </a:t>
+            </a:r>
+            <a:r>
+              <a:rPr lang="de-CH" dirty="0" err="1"/>
+              <a:t>are</a:t>
+            </a:r>
+            <a:r>
+              <a:rPr lang="de-CH" dirty="0"/>
+              <a:t> </a:t>
+            </a:r>
+            <a:r>
+              <a:rPr lang="de-CH" dirty="0" err="1"/>
+              <a:t>allowed</a:t>
+            </a:r>
+            <a:endParaRPr lang="de-CH" dirty="0"/>
+          </a:p>
+          <a:p>
+            <a:pPr marL="0" indent="0">
+              <a:buNone/>
+            </a:pPr>
+            <a:endParaRPr lang="de-CH" dirty="0"/>
+          </a:p>
+          <a:p>
+            <a:pPr>
+              <a:buFont typeface="Wingdings" panose="05000000000000000000" pitchFamily="2" charset="2"/>
+              <a:buChar char="§"/>
+            </a:pPr>
             <a:r>
               <a:rPr lang="de-CH" dirty="0" err="1"/>
               <a:t>Minification</a:t>
             </a:r>
             <a:r>
               <a:rPr lang="de-CH" dirty="0"/>
-              <a:t> (</a:t>
+              <a:t> and </a:t>
             </a:r>
             <a:r>
               <a:rPr lang="de-CH" dirty="0" err="1"/>
-              <a:t>low</a:t>
+              <a:t>correction</a:t>
             </a:r>
             <a:r>
               <a:rPr lang="de-CH" dirty="0"/>
@@ -4883,11 +5090,19 @@
             </a:r>
             <a:r>
               <a:rPr lang="de-CH" dirty="0" err="1"/>
-              <a:t>priority</a:t>
+              <a:t>of</a:t>
             </a:r>
             <a:r>
               <a:rPr lang="de-CH" dirty="0"/>
-              <a:t>)</a:t>
+              <a:t> </a:t>
+            </a:r>
+            <a:r>
+              <a:rPr lang="de-CH" dirty="0" err="1"/>
+              <a:t>wrong</a:t>
+            </a:r>
+            <a:r>
+              <a:rPr lang="de-CH" dirty="0"/>
+              <a:t> tags supported</a:t>
             </a:r>
           </a:p>
         </p:txBody>
@@ -4917,35 +5132,6 @@
               <a:rPr lang="en-US" smtClean="0"/>
               <a:t>10/17/2017</a:t>
             </a:fld>
-            <a:endParaRPr lang="en-US" dirty="0"/>
-          </a:p>
-        </p:txBody>
-      </p:sp>
-      <p:sp>
-        <p:nvSpPr>
-          <p:cNvPr id="5" name="Fußzeilenplatzhalter 4">
-            <a:extLst>
-              <a:ext uri="{FF2B5EF4-FFF2-40B4-BE49-F238E27FC236}">
-                <a16:creationId xmlns:a16="http://schemas.microsoft.com/office/drawing/2014/main" id="{6267E7D4-9916-4477-B11C-46F7A4F13FD3}"/>
-              </a:ext>
-            </a:extLst>
-          </p:cNvPr>
-          <p:cNvSpPr>
-            <a:spLocks noGrp="1"/>
-          </p:cNvSpPr>
-          <p:nvPr>
-            <p:ph type="ftr" sz="quarter" idx="11"/>
-          </p:nvPr>
-        </p:nvSpPr>
-        <p:spPr/>
-        <p:txBody>
-          <a:bodyPr/>
-          <a:lstStyle/>
-          <a:p>
-            <a:r>
-              <a:rPr lang="en-US"/>
-              <a:t>Title of the presentation, Author</a:t>
-            </a:r>
             <a:endParaRPr lang="en-US" dirty="0"/>
           </a:p>
         </p:txBody>
@@ -5036,12 +5222,8 @@
           <a:lstStyle/>
           <a:p>
             <a:r>
-              <a:rPr lang="de-CH" dirty="0" err="1"/>
-              <a:t>Overview</a:t>
-            </a:r>
-            <a:r>
               <a:rPr lang="de-CH" dirty="0"/>
-              <a:t>: Non-</a:t>
+              <a:t>Non-</a:t>
             </a:r>
             <a:r>
               <a:rPr lang="de-CH" dirty="0" err="1"/>
@@ -5136,35 +5318,6 @@
               <a:rPr lang="en-US" smtClean="0"/>
               <a:t>10/17/2017</a:t>
             </a:fld>
-            <a:endParaRPr lang="en-US" dirty="0"/>
-          </a:p>
-        </p:txBody>
-      </p:sp>
-      <p:sp>
-        <p:nvSpPr>
-          <p:cNvPr id="5" name="Fußzeilenplatzhalter 4">
-            <a:extLst>
-              <a:ext uri="{FF2B5EF4-FFF2-40B4-BE49-F238E27FC236}">
-                <a16:creationId xmlns:a16="http://schemas.microsoft.com/office/drawing/2014/main" id="{6267E7D4-9916-4477-B11C-46F7A4F13FD3}"/>
-              </a:ext>
-            </a:extLst>
-          </p:cNvPr>
-          <p:cNvSpPr>
-            <a:spLocks noGrp="1"/>
-          </p:cNvSpPr>
-          <p:nvPr>
-            <p:ph type="ftr" sz="quarter" idx="11"/>
-          </p:nvPr>
-        </p:nvSpPr>
-        <p:spPr/>
-        <p:txBody>
-          <a:bodyPr/>
-          <a:lstStyle/>
-          <a:p>
-            <a:r>
-              <a:rPr lang="en-US"/>
-              <a:t>Title of the presentation, Author</a:t>
-            </a:r>
             <a:endParaRPr lang="en-US" dirty="0"/>
           </a:p>
         </p:txBody>
@@ -5437,35 +5590,6 @@
       </p:sp>
       <p:sp>
         <p:nvSpPr>
-          <p:cNvPr id="5" name="Fußzeilenplatzhalter 4">
-            <a:extLst>
-              <a:ext uri="{FF2B5EF4-FFF2-40B4-BE49-F238E27FC236}">
-                <a16:creationId xmlns:a16="http://schemas.microsoft.com/office/drawing/2014/main" id="{F96AAB84-16C6-4DC2-A36F-1C225B5A5280}"/>
-              </a:ext>
-            </a:extLst>
-          </p:cNvPr>
-          <p:cNvSpPr>
-            <a:spLocks noGrp="1"/>
-          </p:cNvSpPr>
-          <p:nvPr>
-            <p:ph type="ftr" sz="quarter" idx="11"/>
-          </p:nvPr>
-        </p:nvSpPr>
-        <p:spPr/>
-        <p:txBody>
-          <a:bodyPr/>
-          <a:lstStyle/>
-          <a:p>
-            <a:r>
-              <a:rPr lang="en-US"/>
-              <a:t>Title of the presentation, Author</a:t>
-            </a:r>
-            <a:endParaRPr lang="en-US" dirty="0"/>
-          </a:p>
-        </p:txBody>
-      </p:sp>
-      <p:sp>
-        <p:nvSpPr>
           <p:cNvPr id="6" name="Foliennummernplatzhalter 5">
             <a:extLst>
               <a:ext uri="{FF2B5EF4-FFF2-40B4-BE49-F238E27FC236}">
@@ -5634,35 +5758,6 @@
               <a:rPr lang="en-US" smtClean="0"/>
               <a:t>10/17/2017</a:t>
             </a:fld>
-            <a:endParaRPr lang="en-US" dirty="0"/>
-          </a:p>
-        </p:txBody>
-      </p:sp>
-      <p:sp>
-        <p:nvSpPr>
-          <p:cNvPr id="5" name="Fußzeilenplatzhalter 4">
-            <a:extLst>
-              <a:ext uri="{FF2B5EF4-FFF2-40B4-BE49-F238E27FC236}">
-                <a16:creationId xmlns:a16="http://schemas.microsoft.com/office/drawing/2014/main" id="{A9604BE4-CD2F-4F25-B882-6404C3F1A314}"/>
-              </a:ext>
-            </a:extLst>
-          </p:cNvPr>
-          <p:cNvSpPr>
-            <a:spLocks noGrp="1"/>
-          </p:cNvSpPr>
-          <p:nvPr>
-            <p:ph type="ftr" sz="quarter" idx="11"/>
-          </p:nvPr>
-        </p:nvSpPr>
-        <p:spPr/>
-        <p:txBody>
-          <a:bodyPr/>
-          <a:lstStyle/>
-          <a:p>
-            <a:r>
-              <a:rPr lang="en-US"/>
-              <a:t>Title of the presentation, Author</a:t>
-            </a:r>
             <a:endParaRPr lang="en-US" dirty="0"/>
           </a:p>
         </p:txBody>
@@ -5946,7 +6041,7 @@
         <a:effectLst/>
         <a:extLst>
           <a:ext uri="{AF507438-7753-43e0-B8FC-AC1667EBCBE1}">
-            <a14:hiddenEffects xmlns:a14="http://schemas.microsoft.com/office/drawing/2010/main" xmlns="">
+            <a14:hiddenEffects xmlns="" xmlns:a14="http://schemas.microsoft.com/office/drawing/2010/main">
               <a:effectLst>
                 <a:outerShdw blurRad="63500" dist="35921" dir="2700000" algn="ctr" rotWithShape="0">
                   <a:schemeClr val="bg2"/>
@@ -6021,7 +6116,7 @@
         <a:effectLst/>
         <a:extLst>
           <a:ext uri="{AF507438-7753-43e0-B8FC-AC1667EBCBE1}">
-            <a14:hiddenEffects xmlns:a14="http://schemas.microsoft.com/office/drawing/2010/main" xmlns="">
+            <a14:hiddenEffects xmlns="" xmlns:a14="http://schemas.microsoft.com/office/drawing/2010/main">
               <a:effectLst>
                 <a:outerShdw blurRad="63500" dist="35921" dir="2700000" algn="ctr" rotWithShape="0">
                   <a:schemeClr val="bg2"/>

</xml_diff>